<commit_message>
More precise representation of technical view of example E6
</commit_message>
<xml_diff>
--- a/input/images-source/LabExampleE6Technical.pptx
+++ b/input/images-source/LabExampleE6Technical.pptx
@@ -259,7 +259,7 @@
           <a:p>
             <a:fld id="{314C32E8-F0A9-4870-A32A-6F8F0D90A745}" type="datetimeFigureOut">
               <a:rPr lang="fr-FR" smtClean="0"/>
-              <a:t>22/02/2020</a:t>
+              <a:t>02/03/2020</a:t>
             </a:fld>
             <a:endParaRPr lang="fr-FR"/>
           </a:p>
@@ -457,7 +457,7 @@
           <a:p>
             <a:fld id="{314C32E8-F0A9-4870-A32A-6F8F0D90A745}" type="datetimeFigureOut">
               <a:rPr lang="fr-FR" smtClean="0"/>
-              <a:t>22/02/2020</a:t>
+              <a:t>02/03/2020</a:t>
             </a:fld>
             <a:endParaRPr lang="fr-FR"/>
           </a:p>
@@ -665,7 +665,7 @@
           <a:p>
             <a:fld id="{314C32E8-F0A9-4870-A32A-6F8F0D90A745}" type="datetimeFigureOut">
               <a:rPr lang="fr-FR" smtClean="0"/>
-              <a:t>22/02/2020</a:t>
+              <a:t>02/03/2020</a:t>
             </a:fld>
             <a:endParaRPr lang="fr-FR"/>
           </a:p>
@@ -863,7 +863,7 @@
           <a:p>
             <a:fld id="{314C32E8-F0A9-4870-A32A-6F8F0D90A745}" type="datetimeFigureOut">
               <a:rPr lang="fr-FR" smtClean="0"/>
-              <a:t>22/02/2020</a:t>
+              <a:t>02/03/2020</a:t>
             </a:fld>
             <a:endParaRPr lang="fr-FR"/>
           </a:p>
@@ -1138,7 +1138,7 @@
           <a:p>
             <a:fld id="{314C32E8-F0A9-4870-A32A-6F8F0D90A745}" type="datetimeFigureOut">
               <a:rPr lang="fr-FR" smtClean="0"/>
-              <a:t>22/02/2020</a:t>
+              <a:t>02/03/2020</a:t>
             </a:fld>
             <a:endParaRPr lang="fr-FR"/>
           </a:p>
@@ -1403,7 +1403,7 @@
           <a:p>
             <a:fld id="{314C32E8-F0A9-4870-A32A-6F8F0D90A745}" type="datetimeFigureOut">
               <a:rPr lang="fr-FR" smtClean="0"/>
-              <a:t>22/02/2020</a:t>
+              <a:t>02/03/2020</a:t>
             </a:fld>
             <a:endParaRPr lang="fr-FR"/>
           </a:p>
@@ -1815,7 +1815,7 @@
           <a:p>
             <a:fld id="{314C32E8-F0A9-4870-A32A-6F8F0D90A745}" type="datetimeFigureOut">
               <a:rPr lang="fr-FR" smtClean="0"/>
-              <a:t>22/02/2020</a:t>
+              <a:t>02/03/2020</a:t>
             </a:fld>
             <a:endParaRPr lang="fr-FR"/>
           </a:p>
@@ -1956,7 +1956,7 @@
           <a:p>
             <a:fld id="{314C32E8-F0A9-4870-A32A-6F8F0D90A745}" type="datetimeFigureOut">
               <a:rPr lang="fr-FR" smtClean="0"/>
-              <a:t>22/02/2020</a:t>
+              <a:t>02/03/2020</a:t>
             </a:fld>
             <a:endParaRPr lang="fr-FR"/>
           </a:p>
@@ -2069,7 +2069,7 @@
           <a:p>
             <a:fld id="{314C32E8-F0A9-4870-A32A-6F8F0D90A745}" type="datetimeFigureOut">
               <a:rPr lang="fr-FR" smtClean="0"/>
-              <a:t>22/02/2020</a:t>
+              <a:t>02/03/2020</a:t>
             </a:fld>
             <a:endParaRPr lang="fr-FR"/>
           </a:p>
@@ -2380,7 +2380,7 @@
           <a:p>
             <a:fld id="{314C32E8-F0A9-4870-A32A-6F8F0D90A745}" type="datetimeFigureOut">
               <a:rPr lang="fr-FR" smtClean="0"/>
-              <a:t>22/02/2020</a:t>
+              <a:t>02/03/2020</a:t>
             </a:fld>
             <a:endParaRPr lang="fr-FR"/>
           </a:p>
@@ -2668,7 +2668,7 @@
           <a:p>
             <a:fld id="{314C32E8-F0A9-4870-A32A-6F8F0D90A745}" type="datetimeFigureOut">
               <a:rPr lang="fr-FR" smtClean="0"/>
-              <a:t>22/02/2020</a:t>
+              <a:t>02/03/2020</a:t>
             </a:fld>
             <a:endParaRPr lang="fr-FR"/>
           </a:p>
@@ -2909,7 +2909,7 @@
           <a:p>
             <a:fld id="{314C32E8-F0A9-4870-A32A-6F8F0D90A745}" type="datetimeFigureOut">
               <a:rPr lang="fr-FR" smtClean="0"/>
-              <a:t>22/02/2020</a:t>
+              <a:t>02/03/2020</a:t>
             </a:fld>
             <a:endParaRPr lang="fr-FR"/>
           </a:p>
@@ -3340,8 +3340,8 @@
         </p:nvSpPr>
         <p:spPr>
           <a:xfrm>
-            <a:off x="5764955" y="3861511"/>
-            <a:ext cx="3176012" cy="2499456"/>
+            <a:off x="6133099" y="3490322"/>
+            <a:ext cx="3176012" cy="2359158"/>
           </a:xfrm>
           <a:prstGeom prst="roundRect">
             <a:avLst>
@@ -3566,7 +3566,89 @@
         </p:nvSpPr>
         <p:spPr>
           <a:xfrm>
-            <a:off x="9190362" y="3517081"/>
+            <a:off x="10030414" y="1374261"/>
+            <a:ext cx="2012041" cy="910440"/>
+          </a:xfrm>
+          <a:prstGeom prst="roundRect">
+            <a:avLst>
+              <a:gd name="adj" fmla="val 8884"/>
+            </a:avLst>
+          </a:prstGeom>
+          <a:noFill/>
+          <a:ln>
+            <a:solidFill>
+              <a:schemeClr val="tx1"/>
+            </a:solidFill>
+          </a:ln>
+        </p:spPr>
+        <p:style>
+          <a:lnRef idx="2">
+            <a:schemeClr val="accent1">
+              <a:shade val="50000"/>
+            </a:schemeClr>
+          </a:lnRef>
+          <a:fillRef idx="1">
+            <a:schemeClr val="accent1"/>
+          </a:fillRef>
+          <a:effectRef idx="0">
+            <a:schemeClr val="accent1"/>
+          </a:effectRef>
+          <a:fontRef idx="minor">
+            <a:schemeClr val="lt1"/>
+          </a:fontRef>
+        </p:style>
+        <p:txBody>
+          <a:bodyPr lIns="36000" rIns="36000" rtlCol="0" anchor="t" anchorCtr="0"/>
+          <a:lstStyle/>
+          <a:p>
+            <a:r>
+              <a:rPr lang="en-US" dirty="0">
+                <a:solidFill>
+                  <a:srgbClr val="0070C0"/>
+                </a:solidFill>
+              </a:rPr>
+              <a:t>SpecimenDefinition</a:t>
+            </a:r>
+          </a:p>
+          <a:p>
+            <a:pPr marL="268288"/>
+            <a:r>
+              <a:rPr lang="en-US" sz="1600" dirty="0">
+                <a:solidFill>
+                  <a:schemeClr val="tx1"/>
+                </a:solidFill>
+              </a:rPr>
+              <a:t>venous blood</a:t>
+            </a:r>
+          </a:p>
+          <a:p>
+            <a:pPr marL="268288"/>
+            <a:r>
+              <a:rPr lang="en-US" sz="1600" dirty="0">
+                <a:solidFill>
+                  <a:schemeClr val="tx1"/>
+                </a:solidFill>
+              </a:rPr>
+              <a:t>2 mL …</a:t>
+            </a:r>
+          </a:p>
+        </p:txBody>
+      </p:sp>
+      <p:sp>
+        <p:nvSpPr>
+          <p:cNvPr id="24" name="Rectangle : coins arrondis 23">
+            <a:extLst>
+              <a:ext uri="{FF2B5EF4-FFF2-40B4-BE49-F238E27FC236}">
+                <a16:creationId xmlns:a16="http://schemas.microsoft.com/office/drawing/2014/main" id="{02AB1110-47D1-40E7-99B0-0EA356ADDA45}"/>
+              </a:ext>
+            </a:extLst>
+          </p:cNvPr>
+          <p:cNvSpPr/>
+          <p:nvPr/>
+        </p:nvSpPr>
+        <p:spPr>
+          <a:xfrm>
+            <a:off x="3370426" y="5802493"/>
             <a:ext cx="2283724" cy="910440"/>
           </a:xfrm>
           <a:prstGeom prst="roundRect">
@@ -3607,39 +3689,198 @@
                   <a:srgbClr val="0070C0"/>
                 </a:solidFill>
               </a:rPr>
-              <a:t>SpecimenDefinition</a:t>
-            </a:r>
-          </a:p>
-          <a:p>
-            <a:pPr marL="268288"/>
+              <a:t>ObservationDefinition</a:t>
+            </a:r>
+          </a:p>
+          <a:p>
+            <a:pPr marL="176213"/>
             <a:r>
               <a:rPr lang="en-US" sz="1600" dirty="0">
                 <a:solidFill>
+                  <a:srgbClr val="0070C0"/>
+                </a:solidFill>
+              </a:rPr>
+              <a:t>code:</a:t>
+            </a:r>
+            <a:r>
+              <a:rPr lang="en-US" sz="1600" dirty="0">
+                <a:solidFill>
                   <a:schemeClr val="tx1"/>
                 </a:solidFill>
               </a:rPr>
-              <a:t>venous blood</a:t>
-            </a:r>
-          </a:p>
-          <a:p>
-            <a:pPr marL="268288"/>
+              <a:t> (LOINC </a:t>
+            </a:r>
+            <a:r>
+              <a:rPr lang="en-US" sz="1600" noProof="1">
+                <a:solidFill>
+                  <a:schemeClr val="tx1"/>
+                </a:solidFill>
+              </a:rPr>
+              <a:t>14635-7</a:t>
+            </a:r>
             <a:r>
               <a:rPr lang="en-US" sz="1600" dirty="0">
                 <a:solidFill>
                   <a:schemeClr val="tx1"/>
                 </a:solidFill>
               </a:rPr>
-              <a:t>2 mL …</a:t>
-            </a:r>
-          </a:p>
-        </p:txBody>
-      </p:sp>
-      <p:sp>
-        <p:nvSpPr>
-          <p:cNvPr id="24" name="Rectangle : coins arrondis 23">
-            <a:extLst>
-              <a:ext uri="{FF2B5EF4-FFF2-40B4-BE49-F238E27FC236}">
-                <a16:creationId xmlns:a16="http://schemas.microsoft.com/office/drawing/2014/main" id="{02AB1110-47D1-40E7-99B0-0EA356ADDA45}"/>
+              <a:t>)</a:t>
+            </a:r>
+          </a:p>
+          <a:p>
+            <a:pPr marL="176213"/>
+            <a:r>
+              <a:rPr lang="en-US" sz="1600" dirty="0">
+                <a:solidFill>
+                  <a:schemeClr val="tx1"/>
+                </a:solidFill>
+              </a:rPr>
+              <a:t>…</a:t>
+            </a:r>
+          </a:p>
+        </p:txBody>
+      </p:sp>
+      <p:cxnSp>
+        <p:nvCxnSpPr>
+          <p:cNvPr id="31" name="Connecteur droit avec flèche 30">
+            <a:extLst>
+              <a:ext uri="{FF2B5EF4-FFF2-40B4-BE49-F238E27FC236}">
+                <a16:creationId xmlns:a16="http://schemas.microsoft.com/office/drawing/2014/main" id="{F85AD6A8-6DC1-48C5-97A4-6CA1DB5FAC27}"/>
+              </a:ext>
+            </a:extLst>
+          </p:cNvPr>
+          <p:cNvCxnSpPr>
+            <a:cxnSpLocks/>
+            <a:endCxn id="24" idx="3"/>
+          </p:cNvCxnSpPr>
+          <p:nvPr/>
+        </p:nvCxnSpPr>
+        <p:spPr>
+          <a:xfrm flipH="1">
+            <a:off x="5654150" y="5693229"/>
+            <a:ext cx="768422" cy="564484"/>
+          </a:xfrm>
+          <a:prstGeom prst="straightConnector1">
+            <a:avLst/>
+          </a:prstGeom>
+          <a:ln>
+            <a:solidFill>
+              <a:schemeClr val="tx1"/>
+            </a:solidFill>
+            <a:tailEnd type="triangle" w="lg" len="lg"/>
+          </a:ln>
+        </p:spPr>
+        <p:style>
+          <a:lnRef idx="1">
+            <a:schemeClr val="accent1"/>
+          </a:lnRef>
+          <a:fillRef idx="0">
+            <a:schemeClr val="accent1"/>
+          </a:fillRef>
+          <a:effectRef idx="0">
+            <a:schemeClr val="accent1"/>
+          </a:effectRef>
+          <a:fontRef idx="minor">
+            <a:schemeClr val="tx1"/>
+          </a:fontRef>
+        </p:style>
+      </p:cxnSp>
+      <p:cxnSp>
+        <p:nvCxnSpPr>
+          <p:cNvPr id="26" name="Connecteur droit avec flèche 25">
+            <a:extLst>
+              <a:ext uri="{FF2B5EF4-FFF2-40B4-BE49-F238E27FC236}">
+                <a16:creationId xmlns:a16="http://schemas.microsoft.com/office/drawing/2014/main" id="{5B506B3C-8504-4607-A0EC-8CFF7B905C49}"/>
+              </a:ext>
+            </a:extLst>
+          </p:cNvPr>
+          <p:cNvCxnSpPr>
+            <a:cxnSpLocks/>
+            <a:endCxn id="6" idx="1"/>
+          </p:cNvCxnSpPr>
+          <p:nvPr/>
+        </p:nvCxnSpPr>
+        <p:spPr>
+          <a:xfrm flipV="1">
+            <a:off x="8545286" y="1829481"/>
+            <a:ext cx="1485128" cy="3373890"/>
+          </a:xfrm>
+          <a:prstGeom prst="straightConnector1">
+            <a:avLst/>
+          </a:prstGeom>
+          <a:ln>
+            <a:solidFill>
+              <a:schemeClr val="tx1"/>
+            </a:solidFill>
+            <a:tailEnd type="triangle" w="lg" len="lg"/>
+          </a:ln>
+        </p:spPr>
+        <p:style>
+          <a:lnRef idx="1">
+            <a:schemeClr val="accent1"/>
+          </a:lnRef>
+          <a:fillRef idx="0">
+            <a:schemeClr val="accent1"/>
+          </a:fillRef>
+          <a:effectRef idx="0">
+            <a:schemeClr val="accent1"/>
+          </a:effectRef>
+          <a:fontRef idx="minor">
+            <a:schemeClr val="tx1"/>
+          </a:fontRef>
+        </p:style>
+      </p:cxnSp>
+      <p:cxnSp>
+        <p:nvCxnSpPr>
+          <p:cNvPr id="38" name="Connecteur droit avec flèche 37">
+            <a:extLst>
+              <a:ext uri="{FF2B5EF4-FFF2-40B4-BE49-F238E27FC236}">
+                <a16:creationId xmlns:a16="http://schemas.microsoft.com/office/drawing/2014/main" id="{EF1F3B6C-6D4A-41A5-AF56-0F82A7D7C1BF}"/>
+              </a:ext>
+            </a:extLst>
+          </p:cNvPr>
+          <p:cNvCxnSpPr>
+            <a:cxnSpLocks/>
+            <a:endCxn id="4" idx="1"/>
+          </p:cNvCxnSpPr>
+          <p:nvPr/>
+        </p:nvCxnSpPr>
+        <p:spPr>
+          <a:xfrm flipV="1">
+            <a:off x="4844143" y="4669901"/>
+            <a:ext cx="1288956" cy="304870"/>
+          </a:xfrm>
+          <a:prstGeom prst="straightConnector1">
+            <a:avLst/>
+          </a:prstGeom>
+          <a:ln>
+            <a:solidFill>
+              <a:schemeClr val="tx1"/>
+            </a:solidFill>
+            <a:tailEnd type="triangle" w="lg" len="lg"/>
+          </a:ln>
+        </p:spPr>
+        <p:style>
+          <a:lnRef idx="1">
+            <a:schemeClr val="accent1"/>
+          </a:lnRef>
+          <a:fillRef idx="0">
+            <a:schemeClr val="accent1"/>
+          </a:fillRef>
+          <a:effectRef idx="0">
+            <a:schemeClr val="accent1"/>
+          </a:effectRef>
+          <a:fontRef idx="minor">
+            <a:schemeClr val="tx1"/>
+          </a:fontRef>
+        </p:style>
+      </p:cxnSp>
+      <p:sp>
+        <p:nvSpPr>
+          <p:cNvPr id="40" name="Rectangle : coins arrondis 39">
+            <a:extLst>
+              <a:ext uri="{FF2B5EF4-FFF2-40B4-BE49-F238E27FC236}">
+                <a16:creationId xmlns:a16="http://schemas.microsoft.com/office/drawing/2014/main" id="{56F2DF58-EC9E-4922-A566-2D75CDCC10C3}"/>
               </a:ext>
             </a:extLst>
           </p:cNvPr>
@@ -3648,8 +3889,8 @@
         </p:nvSpPr>
         <p:spPr>
           <a:xfrm>
-            <a:off x="9190362" y="5619541"/>
-            <a:ext cx="2283724" cy="910440"/>
+            <a:off x="9788529" y="2624522"/>
+            <a:ext cx="2241963" cy="1191288"/>
           </a:xfrm>
           <a:prstGeom prst="roundRect">
             <a:avLst>
@@ -3693,280 +3934,67 @@
             </a:r>
           </a:p>
           <a:p>
-            <a:pPr marL="176213"/>
+            <a:pPr marL="268288"/>
             <a:r>
               <a:rPr lang="en-US" sz="1600" dirty="0">
                 <a:solidFill>
                   <a:schemeClr val="tx1"/>
                 </a:solidFill>
               </a:rPr>
-              <a:t>code: (LOINC </a:t>
-            </a:r>
-            <a:r>
-              <a:rPr lang="en-US" sz="1600" noProof="1">
+              <a:t>Reason for testing</a:t>
+            </a:r>
+          </a:p>
+          <a:p>
+            <a:pPr marL="268288"/>
+            <a:r>
+              <a:rPr lang="en-US" sz="1600" dirty="0">
                 <a:solidFill>
                   <a:schemeClr val="tx1"/>
                 </a:solidFill>
               </a:rPr>
-              <a:t>14635-7</a:t>
-            </a:r>
+              <a:t>…</a:t>
+            </a:r>
+          </a:p>
+          <a:p>
+            <a:pPr marL="268288"/>
             <a:r>
               <a:rPr lang="en-US" sz="1600" dirty="0">
                 <a:solidFill>
-                  <a:schemeClr val="tx1"/>
-                </a:solidFill>
-              </a:rPr>
-              <a:t>)</a:t>
-            </a:r>
-          </a:p>
-          <a:p>
-            <a:pPr marL="176213"/>
-            <a:r>
-              <a:rPr lang="en-US" sz="1600" dirty="0">
-                <a:solidFill>
-                  <a:schemeClr val="tx1"/>
-                </a:solidFill>
-              </a:rPr>
-              <a:t>…</a:t>
-            </a:r>
+                  <a:srgbClr val="0070C0"/>
+                </a:solidFill>
+              </a:rPr>
+              <a:t>validCodedValueSet</a:t>
+            </a:r>
+          </a:p>
+          <a:p>
+            <a:pPr marL="268288"/>
+            <a:endParaRPr lang="en-US" sz="1600" dirty="0">
+              <a:solidFill>
+                <a:schemeClr val="tx1"/>
+              </a:solidFill>
+            </a:endParaRPr>
           </a:p>
         </p:txBody>
       </p:sp>
       <p:cxnSp>
         <p:nvCxnSpPr>
-          <p:cNvPr id="31" name="Connecteur droit avec flèche 30">
-            <a:extLst>
-              <a:ext uri="{FF2B5EF4-FFF2-40B4-BE49-F238E27FC236}">
-                <a16:creationId xmlns:a16="http://schemas.microsoft.com/office/drawing/2014/main" id="{F85AD6A8-6DC1-48C5-97A4-6CA1DB5FAC27}"/>
+          <p:cNvPr id="48" name="Connecteur droit avec flèche 47">
+            <a:extLst>
+              <a:ext uri="{FF2B5EF4-FFF2-40B4-BE49-F238E27FC236}">
+                <a16:creationId xmlns:a16="http://schemas.microsoft.com/office/drawing/2014/main" id="{BBD92E82-BDCF-4C74-BEA1-9C997A349A10}"/>
               </a:ext>
             </a:extLst>
           </p:cNvPr>
           <p:cNvCxnSpPr>
             <a:cxnSpLocks/>
-            <a:endCxn id="24" idx="1"/>
-          </p:cNvCxnSpPr>
-          <p:nvPr/>
-        </p:nvCxnSpPr>
-        <p:spPr>
-          <a:xfrm>
-            <a:off x="8817981" y="6039070"/>
-            <a:ext cx="372381" cy="35691"/>
-          </a:xfrm>
-          <a:prstGeom prst="straightConnector1">
-            <a:avLst/>
-          </a:prstGeom>
-          <a:ln>
-            <a:solidFill>
-              <a:schemeClr val="tx1"/>
-            </a:solidFill>
-            <a:tailEnd type="triangle" w="lg" len="lg"/>
-          </a:ln>
-        </p:spPr>
-        <p:style>
-          <a:lnRef idx="1">
-            <a:schemeClr val="accent1"/>
-          </a:lnRef>
-          <a:fillRef idx="0">
-            <a:schemeClr val="accent1"/>
-          </a:fillRef>
-          <a:effectRef idx="0">
-            <a:schemeClr val="accent1"/>
-          </a:effectRef>
-          <a:fontRef idx="minor">
-            <a:schemeClr val="tx1"/>
-          </a:fontRef>
-        </p:style>
-      </p:cxnSp>
-      <p:cxnSp>
-        <p:nvCxnSpPr>
-          <p:cNvPr id="26" name="Connecteur droit avec flèche 25">
-            <a:extLst>
-              <a:ext uri="{FF2B5EF4-FFF2-40B4-BE49-F238E27FC236}">
-                <a16:creationId xmlns:a16="http://schemas.microsoft.com/office/drawing/2014/main" id="{5B506B3C-8504-4607-A0EC-8CFF7B905C49}"/>
-              </a:ext>
-            </a:extLst>
-          </p:cNvPr>
-          <p:cNvCxnSpPr>
-            <a:cxnSpLocks/>
-            <a:endCxn id="6" idx="1"/>
+            <a:endCxn id="40" idx="1"/>
           </p:cNvCxnSpPr>
           <p:nvPr/>
         </p:nvCxnSpPr>
         <p:spPr>
           <a:xfrm flipV="1">
-            <a:off x="8154955" y="3972301"/>
-            <a:ext cx="1035407" cy="1572838"/>
-          </a:xfrm>
-          <a:prstGeom prst="straightConnector1">
-            <a:avLst/>
-          </a:prstGeom>
-          <a:ln>
-            <a:solidFill>
-              <a:schemeClr val="tx1"/>
-            </a:solidFill>
-            <a:tailEnd type="triangle" w="lg" len="lg"/>
-          </a:ln>
-        </p:spPr>
-        <p:style>
-          <a:lnRef idx="1">
-            <a:schemeClr val="accent1"/>
-          </a:lnRef>
-          <a:fillRef idx="0">
-            <a:schemeClr val="accent1"/>
-          </a:fillRef>
-          <a:effectRef idx="0">
-            <a:schemeClr val="accent1"/>
-          </a:effectRef>
-          <a:fontRef idx="minor">
-            <a:schemeClr val="tx1"/>
-          </a:fontRef>
-        </p:style>
-      </p:cxnSp>
-      <p:cxnSp>
-        <p:nvCxnSpPr>
-          <p:cNvPr id="38" name="Connecteur droit avec flèche 37">
-            <a:extLst>
-              <a:ext uri="{FF2B5EF4-FFF2-40B4-BE49-F238E27FC236}">
-                <a16:creationId xmlns:a16="http://schemas.microsoft.com/office/drawing/2014/main" id="{EF1F3B6C-6D4A-41A5-AF56-0F82A7D7C1BF}"/>
-              </a:ext>
-            </a:extLst>
-          </p:cNvPr>
-          <p:cNvCxnSpPr>
-            <a:cxnSpLocks/>
-            <a:endCxn id="4" idx="1"/>
-          </p:cNvCxnSpPr>
-          <p:nvPr/>
-        </p:nvCxnSpPr>
-        <p:spPr>
-          <a:xfrm flipV="1">
-            <a:off x="5112493" y="5111239"/>
-            <a:ext cx="652462" cy="135853"/>
-          </a:xfrm>
-          <a:prstGeom prst="straightConnector1">
-            <a:avLst/>
-          </a:prstGeom>
-          <a:ln>
-            <a:solidFill>
-              <a:schemeClr val="tx1"/>
-            </a:solidFill>
-            <a:tailEnd type="triangle" w="lg" len="lg"/>
-          </a:ln>
-        </p:spPr>
-        <p:style>
-          <a:lnRef idx="1">
-            <a:schemeClr val="accent1"/>
-          </a:lnRef>
-          <a:fillRef idx="0">
-            <a:schemeClr val="accent1"/>
-          </a:fillRef>
-          <a:effectRef idx="0">
-            <a:schemeClr val="accent1"/>
-          </a:effectRef>
-          <a:fontRef idx="minor">
-            <a:schemeClr val="tx1"/>
-          </a:fontRef>
-        </p:style>
-      </p:cxnSp>
-      <p:sp>
-        <p:nvSpPr>
-          <p:cNvPr id="40" name="Rectangle : coins arrondis 39">
-            <a:extLst>
-              <a:ext uri="{FF2B5EF4-FFF2-40B4-BE49-F238E27FC236}">
-                <a16:creationId xmlns:a16="http://schemas.microsoft.com/office/drawing/2014/main" id="{56F2DF58-EC9E-4922-A566-2D75CDCC10C3}"/>
-              </a:ext>
-            </a:extLst>
-          </p:cNvPr>
-          <p:cNvSpPr/>
-          <p:nvPr/>
-        </p:nvSpPr>
-        <p:spPr>
-          <a:xfrm>
-            <a:off x="9190362" y="4567644"/>
-            <a:ext cx="2283724" cy="910440"/>
-          </a:xfrm>
-          <a:prstGeom prst="roundRect">
-            <a:avLst>
-              <a:gd name="adj" fmla="val 8884"/>
-            </a:avLst>
-          </a:prstGeom>
-          <a:noFill/>
-          <a:ln>
-            <a:solidFill>
-              <a:schemeClr val="tx1"/>
-            </a:solidFill>
-          </a:ln>
-        </p:spPr>
-        <p:style>
-          <a:lnRef idx="2">
-            <a:schemeClr val="accent1">
-              <a:shade val="50000"/>
-            </a:schemeClr>
-          </a:lnRef>
-          <a:fillRef idx="1">
-            <a:schemeClr val="accent1"/>
-          </a:fillRef>
-          <a:effectRef idx="0">
-            <a:schemeClr val="accent1"/>
-          </a:effectRef>
-          <a:fontRef idx="minor">
-            <a:schemeClr val="lt1"/>
-          </a:fontRef>
-        </p:style>
-        <p:txBody>
-          <a:bodyPr lIns="36000" rIns="36000" rtlCol="0" anchor="t" anchorCtr="0"/>
-          <a:lstStyle/>
-          <a:p>
-            <a:r>
-              <a:rPr lang="en-US" dirty="0">
-                <a:solidFill>
-                  <a:srgbClr val="0070C0"/>
-                </a:solidFill>
-              </a:rPr>
-              <a:t>ObservationDefinition</a:t>
-            </a:r>
-          </a:p>
-          <a:p>
-            <a:pPr marL="268288"/>
-            <a:r>
-              <a:rPr lang="en-US" sz="1600" dirty="0">
-                <a:solidFill>
-                  <a:schemeClr val="tx1"/>
-                </a:solidFill>
-              </a:rPr>
-              <a:t>Reason for testing</a:t>
-            </a:r>
-          </a:p>
-          <a:p>
-            <a:pPr marL="268288"/>
-            <a:r>
-              <a:rPr lang="en-US" sz="1600" dirty="0">
-                <a:solidFill>
-                  <a:schemeClr val="tx1"/>
-                </a:solidFill>
-              </a:rPr>
-              <a:t>…</a:t>
-            </a:r>
-          </a:p>
-        </p:txBody>
-      </p:sp>
-      <p:cxnSp>
-        <p:nvCxnSpPr>
-          <p:cNvPr id="48" name="Connecteur droit avec flèche 47">
-            <a:extLst>
-              <a:ext uri="{FF2B5EF4-FFF2-40B4-BE49-F238E27FC236}">
-                <a16:creationId xmlns:a16="http://schemas.microsoft.com/office/drawing/2014/main" id="{BBD92E82-BDCF-4C74-BEA1-9C997A349A10}"/>
-              </a:ext>
-            </a:extLst>
-          </p:cNvPr>
-          <p:cNvCxnSpPr>
-            <a:cxnSpLocks/>
-          </p:cNvCxnSpPr>
-          <p:nvPr/>
-        </p:nvCxnSpPr>
-        <p:spPr>
-          <a:xfrm flipV="1">
-            <a:off x="8322906" y="5022865"/>
-            <a:ext cx="867456" cy="799437"/>
+            <a:off x="8701296" y="3220166"/>
+            <a:ext cx="1087233" cy="2211806"/>
           </a:xfrm>
           <a:prstGeom prst="straightConnector1">
             <a:avLst/>
@@ -4009,7 +4037,7 @@
         </p:nvCxnSpPr>
         <p:spPr>
           <a:xfrm flipH="1">
-            <a:off x="2517247" y="1655665"/>
+            <a:off x="2234220" y="1318207"/>
             <a:ext cx="453855" cy="0"/>
           </a:xfrm>
           <a:prstGeom prst="straightConnector1">
@@ -4051,7 +4079,7 @@
         </p:nvSpPr>
         <p:spPr>
           <a:xfrm>
-            <a:off x="432572" y="1123139"/>
+            <a:off x="149545" y="785681"/>
             <a:ext cx="2084675" cy="1613057"/>
           </a:xfrm>
           <a:prstGeom prst="roundRect">
@@ -4117,7 +4145,15 @@
                   <a:srgbClr val="0070C0"/>
                 </a:solidFill>
               </a:rPr>
-              <a:t>   category: lab</a:t>
+              <a:t>   category: </a:t>
+            </a:r>
+            <a:r>
+              <a:rPr lang="en-US" sz="1600" dirty="0">
+                <a:solidFill>
+                  <a:schemeClr val="tx1"/>
+                </a:solidFill>
+              </a:rPr>
+              <a:t>lab</a:t>
             </a:r>
           </a:p>
           <a:p>
@@ -4166,8 +4202,8 @@
         </p:nvSpPr>
         <p:spPr>
           <a:xfrm>
-            <a:off x="2686498" y="1123139"/>
-            <a:ext cx="2750585" cy="4998275"/>
+            <a:off x="2403471" y="785682"/>
+            <a:ext cx="2750585" cy="4646290"/>
           </a:xfrm>
           <a:prstGeom prst="roundRect">
             <a:avLst>
@@ -4562,7 +4598,7 @@
         </p:nvSpPr>
         <p:spPr>
           <a:xfrm>
-            <a:off x="432572" y="497033"/>
+            <a:off x="149545" y="159575"/>
             <a:ext cx="10681982" cy="461665"/>
           </a:xfrm>
           <a:prstGeom prst="rect">
@@ -4635,7 +4671,7 @@
         </p:nvCxnSpPr>
         <p:spPr>
           <a:xfrm>
-            <a:off x="4618653" y="2159020"/>
+            <a:off x="4335626" y="1821562"/>
             <a:ext cx="987681" cy="0"/>
           </a:xfrm>
           <a:prstGeom prst="straightConnector1">
@@ -4677,8 +4713,8 @@
         </p:nvSpPr>
         <p:spPr>
           <a:xfrm>
-            <a:off x="5606334" y="1001012"/>
-            <a:ext cx="4013528" cy="2359158"/>
+            <a:off x="5323307" y="663554"/>
+            <a:ext cx="4013528" cy="2704124"/>
           </a:xfrm>
           <a:prstGeom prst="roundRect">
             <a:avLst>
@@ -4748,7 +4784,7 @@
             <a:r>
               <a:rPr lang="en-US" sz="1600" noProof="1">
                 <a:solidFill>
-                  <a:srgbClr val="0070C0"/>
+                  <a:schemeClr val="tx1"/>
                 </a:solidFill>
                 <a:highlight>
                   <a:srgbClr val="00FFFF"/>
@@ -4762,7 +4798,7 @@
             <a:r>
               <a:rPr lang="en-US" sz="1600" noProof="1">
                 <a:solidFill>
-                  <a:srgbClr val="0070C0"/>
+                  <a:schemeClr val="tx1"/>
                 </a:solidFill>
                 <a:highlight>
                   <a:srgbClr val="00FFFF"/>
@@ -4776,7 +4812,7 @@
             <a:r>
               <a:rPr lang="en-US" sz="1600" noProof="1">
                 <a:solidFill>
-                  <a:srgbClr val="0070C0"/>
+                  <a:schemeClr val="tx1"/>
                 </a:solidFill>
                 <a:highlight>
                   <a:srgbClr val="00FFFF"/>
@@ -4790,7 +4826,7 @@
             <a:r>
               <a:rPr lang="en-US" sz="1600" noProof="1">
                 <a:solidFill>
-                  <a:srgbClr val="0070C0"/>
+                  <a:schemeClr val="tx1"/>
                 </a:solidFill>
                 <a:highlight>
                   <a:srgbClr val="00FFFF"/>
@@ -4804,7 +4840,7 @@
             <a:r>
               <a:rPr lang="en-US" sz="1600" noProof="1">
                 <a:solidFill>
-                  <a:srgbClr val="0070C0"/>
+                  <a:schemeClr val="tx1"/>
                 </a:solidFill>
                 <a:highlight>
                   <a:srgbClr val="00FFFF"/>
@@ -4817,27 +4853,322 @@
             <a:r>
               <a:rPr lang="en-US" sz="1600" noProof="1">
                 <a:solidFill>
-                  <a:srgbClr val="0070C0"/>
+                  <a:schemeClr val="tx1"/>
+                </a:solidFill>
+              </a:rPr>
+              <a:t>   ]</a:t>
+            </a:r>
+          </a:p>
+          <a:p>
+            <a:r>
+              <a:rPr lang="en-US" sz="1600" noProof="1">
+                <a:solidFill>
+                  <a:srgbClr val="0070C0"/>
+                </a:solidFill>
+              </a:rPr>
+              <a:t>   code {coding {system: </a:t>
+            </a:r>
+            <a:r>
+              <a:rPr lang="en-US" sz="1600" noProof="1">
+                <a:solidFill>
+                  <a:schemeClr val="tx1"/>
+                </a:solidFill>
+              </a:rPr>
+              <a:t>NABM</a:t>
+            </a:r>
+            <a:r>
+              <a:rPr lang="en-US" sz="1600" noProof="1">
+                <a:solidFill>
+                  <a:srgbClr val="0070C0"/>
+                </a:solidFill>
+              </a:rPr>
+              <a:t>, code: </a:t>
+            </a:r>
+            <a:r>
+              <a:rPr lang="en-US" sz="1600" noProof="1">
+                <a:solidFill>
+                  <a:schemeClr val="tx1"/>
+                </a:solidFill>
+              </a:rPr>
+              <a:t>1139</a:t>
+            </a:r>
+            <a:r>
+              <a:rPr lang="en-US" sz="1600" noProof="1">
+                <a:solidFill>
+                  <a:srgbClr val="0070C0"/>
+                </a:solidFill>
+              </a:rPr>
+              <a:t>}}</a:t>
+            </a:r>
+          </a:p>
+          <a:p>
+            <a:r>
+              <a:rPr lang="en-US" sz="1600" noProof="1">
+                <a:solidFill>
+                  <a:srgbClr val="0070C0"/>
+                </a:solidFill>
+              </a:rPr>
+              <a:t>   priceComponent {code: </a:t>
+            </a:r>
+            <a:r>
+              <a:rPr lang="en-US" sz="1600" noProof="1">
+                <a:solidFill>
+                  <a:schemeClr val="tx1"/>
+                </a:solidFill>
+              </a:rPr>
+              <a:t>B</a:t>
+            </a:r>
+            <a:r>
+              <a:rPr lang="en-US" sz="1600" noProof="1">
+                <a:solidFill>
+                  <a:srgbClr val="0070C0"/>
+                </a:solidFill>
+              </a:rPr>
+              <a:t>, factor: </a:t>
+            </a:r>
+            <a:r>
+              <a:rPr lang="en-US" sz="1600" noProof="1">
+                <a:solidFill>
+                  <a:schemeClr val="tx1"/>
+                </a:solidFill>
+              </a:rPr>
+              <a:t>35</a:t>
+            </a:r>
+            <a:r>
+              <a:rPr lang="en-US" sz="1600" noProof="1">
+                <a:solidFill>
+                  <a:srgbClr val="0070C0"/>
+                </a:solidFill>
+              </a:rPr>
+              <a:t>}</a:t>
+            </a:r>
+          </a:p>
+        </p:txBody>
+      </p:sp>
+      <p:sp>
+        <p:nvSpPr>
+          <p:cNvPr id="30" name="Rectangle : coins arrondis 29">
+            <a:extLst>
+              <a:ext uri="{FF2B5EF4-FFF2-40B4-BE49-F238E27FC236}">
+                <a16:creationId xmlns:a16="http://schemas.microsoft.com/office/drawing/2014/main" id="{DAA97A18-2FE1-4961-B992-0160AF770DC3}"/>
+              </a:ext>
+            </a:extLst>
+          </p:cNvPr>
+          <p:cNvSpPr/>
+          <p:nvPr/>
+        </p:nvSpPr>
+        <p:spPr>
+          <a:xfrm>
+            <a:off x="9561266" y="4013263"/>
+            <a:ext cx="2434429" cy="2699669"/>
+          </a:xfrm>
+          <a:prstGeom prst="roundRect">
+            <a:avLst>
+              <a:gd name="adj" fmla="val 8884"/>
+            </a:avLst>
+          </a:prstGeom>
+          <a:noFill/>
+          <a:ln>
+            <a:solidFill>
+              <a:schemeClr val="tx1"/>
+            </a:solidFill>
+          </a:ln>
+        </p:spPr>
+        <p:style>
+          <a:lnRef idx="2">
+            <a:schemeClr val="accent1">
+              <a:shade val="50000"/>
+            </a:schemeClr>
+          </a:lnRef>
+          <a:fillRef idx="1">
+            <a:schemeClr val="accent1"/>
+          </a:fillRef>
+          <a:effectRef idx="0">
+            <a:schemeClr val="accent1"/>
+          </a:effectRef>
+          <a:fontRef idx="minor">
+            <a:schemeClr val="lt1"/>
+          </a:fontRef>
+        </p:style>
+        <p:txBody>
+          <a:bodyPr lIns="36000" rIns="36000" rtlCol="0" anchor="t" anchorCtr="0"/>
+          <a:lstStyle/>
+          <a:p>
+            <a:r>
+              <a:rPr lang="en-US" dirty="0">
+                <a:solidFill>
+                  <a:srgbClr val="0070C0"/>
+                </a:solidFill>
+              </a:rPr>
+              <a:t>ValueSet</a:t>
+            </a:r>
+          </a:p>
+          <a:p>
+            <a:pPr marL="176213"/>
+            <a:r>
+              <a:rPr lang="en-US" sz="1600" dirty="0">
+                <a:solidFill>
+                  <a:schemeClr val="tx1"/>
+                </a:solidFill>
+              </a:rPr>
+              <a:t>Reasons for Vitamin D</a:t>
+            </a:r>
+          </a:p>
+          <a:p>
+            <a:pPr marL="268288"/>
+            <a:r>
+              <a:rPr lang="en-US" sz="1600" dirty="0">
+                <a:solidFill>
+                  <a:srgbClr val="0070C0"/>
+                </a:solidFill>
+              </a:rPr>
+              <a:t>…</a:t>
+            </a:r>
+          </a:p>
+          <a:p>
+            <a:pPr marL="268288"/>
+            <a:r>
+              <a:rPr lang="en-US" sz="1600" dirty="0">
+                <a:solidFill>
+                  <a:srgbClr val="0070C0"/>
+                </a:solidFill>
+              </a:rPr>
+              <a:t>compose</a:t>
+            </a:r>
+          </a:p>
+          <a:p>
+            <a:pPr marL="268288" lvl="1"/>
+            <a:r>
+              <a:rPr lang="en-US" sz="1600" dirty="0">
+                <a:solidFill>
+                  <a:srgbClr val="0070C0"/>
+                </a:solidFill>
+              </a:rPr>
+              <a:t>include [</a:t>
+            </a:r>
+          </a:p>
+          <a:p>
+            <a:pPr marL="533400" lvl="2"/>
+            <a:r>
+              <a:rPr lang="en-US" sz="1600" dirty="0">
+                <a:solidFill>
+                  <a:schemeClr val="tx1"/>
                 </a:solidFill>
                 <a:highlight>
                   <a:srgbClr val="00FFFF"/>
                 </a:highlight>
               </a:rPr>
-              <a:t>   ]</a:t>
-            </a:r>
-          </a:p>
-          <a:p>
-            <a:r>
-              <a:rPr lang="en-US" sz="1600" noProof="1">
-                <a:solidFill>
-                  <a:srgbClr val="0070C0"/>
-                </a:solidFill>
-              </a:rPr>
-              <a:t>   code {coding {system: NABM, code: 1139}}</a:t>
-            </a:r>
-          </a:p>
-        </p:txBody>
-      </p:sp>
+              <a:t>osteomalacia</a:t>
+            </a:r>
+          </a:p>
+          <a:p>
+            <a:pPr marL="533400" lvl="2"/>
+            <a:r>
+              <a:rPr lang="en-US" sz="1600" dirty="0">
+                <a:solidFill>
+                  <a:schemeClr val="tx1"/>
+                </a:solidFill>
+                <a:highlight>
+                  <a:srgbClr val="00FFFF"/>
+                </a:highlight>
+              </a:rPr>
+              <a:t>transplanted kidney</a:t>
+            </a:r>
+          </a:p>
+          <a:p>
+            <a:pPr marL="533400" lvl="2"/>
+            <a:r>
+              <a:rPr lang="en-US" sz="1600" dirty="0">
+                <a:solidFill>
+                  <a:schemeClr val="tx1"/>
+                </a:solidFill>
+                <a:highlight>
+                  <a:srgbClr val="00FFFF"/>
+                </a:highlight>
+              </a:rPr>
+              <a:t>bariatric surgery</a:t>
+            </a:r>
+          </a:p>
+          <a:p>
+            <a:pPr marL="533400" lvl="2"/>
+            <a:r>
+              <a:rPr lang="en-US" sz="1600" dirty="0">
+                <a:solidFill>
+                  <a:schemeClr val="tx1"/>
+                </a:solidFill>
+                <a:highlight>
+                  <a:srgbClr val="00FFFF"/>
+                </a:highlight>
+              </a:rPr>
+              <a:t>…</a:t>
+            </a:r>
+          </a:p>
+          <a:p>
+            <a:pPr marL="268288" lvl="1"/>
+            <a:r>
+              <a:rPr lang="en-US" sz="1600" dirty="0">
+                <a:solidFill>
+                  <a:srgbClr val="0070C0"/>
+                </a:solidFill>
+              </a:rPr>
+              <a:t>]</a:t>
+            </a:r>
+          </a:p>
+          <a:p>
+            <a:pPr marL="358775" lvl="1"/>
+            <a:endParaRPr lang="en-US" sz="1600" dirty="0">
+              <a:solidFill>
+                <a:schemeClr val="tx1"/>
+              </a:solidFill>
+            </a:endParaRPr>
+          </a:p>
+        </p:txBody>
+      </p:sp>
+      <p:cxnSp>
+        <p:nvCxnSpPr>
+          <p:cNvPr id="37" name="Connecteur droit avec flèche 36">
+            <a:extLst>
+              <a:ext uri="{FF2B5EF4-FFF2-40B4-BE49-F238E27FC236}">
+                <a16:creationId xmlns:a16="http://schemas.microsoft.com/office/drawing/2014/main" id="{058CFA87-E0A7-48AC-A815-893AB87B28FD}"/>
+              </a:ext>
+            </a:extLst>
+          </p:cNvPr>
+          <p:cNvCxnSpPr>
+            <a:cxnSpLocks/>
+            <a:endCxn id="30" idx="0"/>
+          </p:cNvCxnSpPr>
+          <p:nvPr/>
+        </p:nvCxnSpPr>
+        <p:spPr>
+          <a:xfrm flipH="1">
+            <a:off x="10778481" y="3679371"/>
+            <a:ext cx="891006" cy="333892"/>
+          </a:xfrm>
+          <a:prstGeom prst="straightConnector1">
+            <a:avLst/>
+          </a:prstGeom>
+          <a:ln>
+            <a:solidFill>
+              <a:schemeClr val="tx1"/>
+            </a:solidFill>
+            <a:tailEnd type="triangle" w="lg" len="lg"/>
+          </a:ln>
+        </p:spPr>
+        <p:style>
+          <a:lnRef idx="1">
+            <a:schemeClr val="accent1"/>
+          </a:lnRef>
+          <a:fillRef idx="0">
+            <a:schemeClr val="accent1"/>
+          </a:fillRef>
+          <a:effectRef idx="0">
+            <a:schemeClr val="accent1"/>
+          </a:effectRef>
+          <a:fontRef idx="minor">
+            <a:schemeClr val="tx1"/>
+          </a:fontRef>
+        </p:style>
+      </p:cxnSp>
     </p:spTree>
     <p:extLst>
       <p:ext uri="{BB962C8B-B14F-4D97-AF65-F5344CB8AC3E}">

</xml_diff>

<commit_message>
Added two example ValueSet for ObservationDefinition valid coded values and normal coded values
</commit_message>
<xml_diff>
--- a/input/images-source/LabExampleE6Technical.pptx
+++ b/input/images-source/LabExampleE6Technical.pptx
@@ -259,7 +259,7 @@
           <a:p>
             <a:fld id="{314C32E8-F0A9-4870-A32A-6F8F0D90A745}" type="datetimeFigureOut">
               <a:rPr lang="fr-FR" smtClean="0"/>
-              <a:t>02/03/2020</a:t>
+              <a:t>10/03/2020</a:t>
             </a:fld>
             <a:endParaRPr lang="fr-FR"/>
           </a:p>
@@ -457,7 +457,7 @@
           <a:p>
             <a:fld id="{314C32E8-F0A9-4870-A32A-6F8F0D90A745}" type="datetimeFigureOut">
               <a:rPr lang="fr-FR" smtClean="0"/>
-              <a:t>02/03/2020</a:t>
+              <a:t>10/03/2020</a:t>
             </a:fld>
             <a:endParaRPr lang="fr-FR"/>
           </a:p>
@@ -665,7 +665,7 @@
           <a:p>
             <a:fld id="{314C32E8-F0A9-4870-A32A-6F8F0D90A745}" type="datetimeFigureOut">
               <a:rPr lang="fr-FR" smtClean="0"/>
-              <a:t>02/03/2020</a:t>
+              <a:t>10/03/2020</a:t>
             </a:fld>
             <a:endParaRPr lang="fr-FR"/>
           </a:p>
@@ -863,7 +863,7 @@
           <a:p>
             <a:fld id="{314C32E8-F0A9-4870-A32A-6F8F0D90A745}" type="datetimeFigureOut">
               <a:rPr lang="fr-FR" smtClean="0"/>
-              <a:t>02/03/2020</a:t>
+              <a:t>10/03/2020</a:t>
             </a:fld>
             <a:endParaRPr lang="fr-FR"/>
           </a:p>
@@ -1138,7 +1138,7 @@
           <a:p>
             <a:fld id="{314C32E8-F0A9-4870-A32A-6F8F0D90A745}" type="datetimeFigureOut">
               <a:rPr lang="fr-FR" smtClean="0"/>
-              <a:t>02/03/2020</a:t>
+              <a:t>10/03/2020</a:t>
             </a:fld>
             <a:endParaRPr lang="fr-FR"/>
           </a:p>
@@ -1403,7 +1403,7 @@
           <a:p>
             <a:fld id="{314C32E8-F0A9-4870-A32A-6F8F0D90A745}" type="datetimeFigureOut">
               <a:rPr lang="fr-FR" smtClean="0"/>
-              <a:t>02/03/2020</a:t>
+              <a:t>10/03/2020</a:t>
             </a:fld>
             <a:endParaRPr lang="fr-FR"/>
           </a:p>
@@ -1815,7 +1815,7 @@
           <a:p>
             <a:fld id="{314C32E8-F0A9-4870-A32A-6F8F0D90A745}" type="datetimeFigureOut">
               <a:rPr lang="fr-FR" smtClean="0"/>
-              <a:t>02/03/2020</a:t>
+              <a:t>10/03/2020</a:t>
             </a:fld>
             <a:endParaRPr lang="fr-FR"/>
           </a:p>
@@ -1956,7 +1956,7 @@
           <a:p>
             <a:fld id="{314C32E8-F0A9-4870-A32A-6F8F0D90A745}" type="datetimeFigureOut">
               <a:rPr lang="fr-FR" smtClean="0"/>
-              <a:t>02/03/2020</a:t>
+              <a:t>10/03/2020</a:t>
             </a:fld>
             <a:endParaRPr lang="fr-FR"/>
           </a:p>
@@ -2069,7 +2069,7 @@
           <a:p>
             <a:fld id="{314C32E8-F0A9-4870-A32A-6F8F0D90A745}" type="datetimeFigureOut">
               <a:rPr lang="fr-FR" smtClean="0"/>
-              <a:t>02/03/2020</a:t>
+              <a:t>10/03/2020</a:t>
             </a:fld>
             <a:endParaRPr lang="fr-FR"/>
           </a:p>
@@ -2380,7 +2380,7 @@
           <a:p>
             <a:fld id="{314C32E8-F0A9-4870-A32A-6F8F0D90A745}" type="datetimeFigureOut">
               <a:rPr lang="fr-FR" smtClean="0"/>
-              <a:t>02/03/2020</a:t>
+              <a:t>10/03/2020</a:t>
             </a:fld>
             <a:endParaRPr lang="fr-FR"/>
           </a:p>
@@ -2668,7 +2668,7 @@
           <a:p>
             <a:fld id="{314C32E8-F0A9-4870-A32A-6F8F0D90A745}" type="datetimeFigureOut">
               <a:rPr lang="fr-FR" smtClean="0"/>
-              <a:t>02/03/2020</a:t>
+              <a:t>10/03/2020</a:t>
             </a:fld>
             <a:endParaRPr lang="fr-FR"/>
           </a:p>
@@ -2909,7 +2909,7 @@
           <a:p>
             <a:fld id="{314C32E8-F0A9-4870-A32A-6F8F0D90A745}" type="datetimeFigureOut">
               <a:rPr lang="fr-FR" smtClean="0"/>
-              <a:t>02/03/2020</a:t>
+              <a:t>10/03/2020</a:t>
             </a:fld>
             <a:endParaRPr lang="fr-FR"/>
           </a:p>
@@ -3934,7 +3934,7 @@
             </a:r>
           </a:p>
           <a:p>
-            <a:pPr marL="268288"/>
+            <a:pPr marL="177800"/>
             <a:r>
               <a:rPr lang="en-US" sz="1600" dirty="0">
                 <a:solidFill>
@@ -3945,7 +3945,7 @@
             </a:r>
           </a:p>
           <a:p>
-            <a:pPr marL="268288"/>
+            <a:pPr marL="177800"/>
             <a:r>
               <a:rPr lang="en-US" sz="1600" dirty="0">
                 <a:solidFill>
@@ -3956,14 +3956,14 @@
             </a:r>
           </a:p>
           <a:p>
-            <a:pPr marL="268288"/>
+            <a:pPr marL="177800"/>
             <a:r>
               <a:rPr lang="en-US" sz="1600" dirty="0">
                 <a:solidFill>
                   <a:srgbClr val="0070C0"/>
                 </a:solidFill>
               </a:rPr>
-              <a:t>validCodedValueSet</a:t>
+              <a:t>normalCodedValueSet</a:t>
             </a:r>
           </a:p>
           <a:p>
@@ -5004,7 +5004,7 @@
             </a:r>
           </a:p>
           <a:p>
-            <a:pPr marL="176213"/>
+            <a:pPr marL="93663"/>
             <a:r>
               <a:rPr lang="en-US" sz="1600" dirty="0">
                 <a:solidFill>
@@ -5015,7 +5015,7 @@
             </a:r>
           </a:p>
           <a:p>
-            <a:pPr marL="268288"/>
+            <a:pPr marL="93663"/>
             <a:r>
               <a:rPr lang="en-US" sz="1600" dirty="0">
                 <a:solidFill>
@@ -5026,7 +5026,7 @@
             </a:r>
           </a:p>
           <a:p>
-            <a:pPr marL="268288"/>
+            <a:pPr marL="93663"/>
             <a:r>
               <a:rPr lang="en-US" sz="1600" dirty="0">
                 <a:solidFill>
@@ -5037,7 +5037,7 @@
             </a:r>
           </a:p>
           <a:p>
-            <a:pPr marL="268288" lvl="1"/>
+            <a:pPr marL="93663" lvl="1"/>
             <a:r>
               <a:rPr lang="en-US" sz="1600" dirty="0">
                 <a:solidFill>
@@ -5048,7 +5048,7 @@
             </a:r>
           </a:p>
           <a:p>
-            <a:pPr marL="533400" lvl="2"/>
+            <a:pPr marL="177800" lvl="2"/>
             <a:r>
               <a:rPr lang="en-US" sz="1600" dirty="0">
                 <a:solidFill>
@@ -5058,11 +5058,11 @@
                   <a:srgbClr val="00FFFF"/>
                 </a:highlight>
               </a:rPr>
-              <a:t>osteomalacia</a:t>
-            </a:r>
-          </a:p>
-          <a:p>
-            <a:pPr marL="533400" lvl="2"/>
+              <a:t>is-a osteomalacia</a:t>
+            </a:r>
+          </a:p>
+          <a:p>
+            <a:pPr marL="177800" lvl="2"/>
             <a:r>
               <a:rPr lang="en-US" sz="1600" dirty="0">
                 <a:solidFill>
@@ -5072,11 +5072,11 @@
                   <a:srgbClr val="00FFFF"/>
                 </a:highlight>
               </a:rPr>
-              <a:t>transplanted kidney</a:t>
-            </a:r>
-          </a:p>
-          <a:p>
-            <a:pPr marL="533400" lvl="2"/>
+              <a:t>is-a transplanted kidney</a:t>
+            </a:r>
+          </a:p>
+          <a:p>
+            <a:pPr marL="177800" lvl="2"/>
             <a:r>
               <a:rPr lang="en-US" sz="1600" dirty="0">
                 <a:solidFill>
@@ -5086,11 +5086,11 @@
                   <a:srgbClr val="00FFFF"/>
                 </a:highlight>
               </a:rPr>
-              <a:t>bariatric surgery</a:t>
-            </a:r>
-          </a:p>
-          <a:p>
-            <a:pPr marL="533400" lvl="2"/>
+              <a:t>is-a bariatric surgery</a:t>
+            </a:r>
+          </a:p>
+          <a:p>
+            <a:pPr marL="177800" lvl="2"/>
             <a:r>
               <a:rPr lang="en-US" sz="1600" dirty="0">
                 <a:solidFill>
@@ -5104,7 +5104,7 @@
             </a:r>
           </a:p>
           <a:p>
-            <a:pPr marL="268288" lvl="1"/>
+            <a:pPr marL="177800" lvl="1"/>
             <a:r>
               <a:rPr lang="en-US" sz="1600" dirty="0">
                 <a:solidFill>

</xml_diff>